<commit_message>
updated presentation - added oauth and animation
</commit_message>
<xml_diff>
--- a/Helios.pptx
+++ b/Helios.pptx
@@ -10,9 +10,11 @@
     <p:sldId id="259" r:id="rId4"/>
     <p:sldId id="260" r:id="rId5"/>
     <p:sldId id="261" r:id="rId6"/>
-    <p:sldId id="262" r:id="rId7"/>
-    <p:sldId id="263" r:id="rId8"/>
-    <p:sldId id="264" r:id="rId9"/>
+    <p:sldId id="266" r:id="rId7"/>
+    <p:sldId id="262" r:id="rId8"/>
+    <p:sldId id="263" r:id="rId9"/>
+    <p:sldId id="267" r:id="rId10"/>
+    <p:sldId id="264" r:id="rId11"/>
   </p:sldIdLst>
   <p:sldSz cx="12192000" cy="6858000"/>
   <p:notesSz cx="6858000" cy="9144000"/>
@@ -266,7 +268,7 @@
           <a:p>
             <a:fld id="{449F65A8-A104-4659-BCA1-741252EC1BE3}" type="datetimeFigureOut">
               <a:rPr lang="ru-RU" smtClean="0"/>
-              <a:t>04.09.2019</a:t>
+              <a:t>10.09.2019</a:t>
             </a:fld>
             <a:endParaRPr lang="ru-RU"/>
           </a:p>
@@ -464,7 +466,7 @@
           <a:p>
             <a:fld id="{449F65A8-A104-4659-BCA1-741252EC1BE3}" type="datetimeFigureOut">
               <a:rPr lang="ru-RU" smtClean="0"/>
-              <a:t>04.09.2019</a:t>
+              <a:t>10.09.2019</a:t>
             </a:fld>
             <a:endParaRPr lang="ru-RU"/>
           </a:p>
@@ -672,7 +674,7 @@
           <a:p>
             <a:fld id="{449F65A8-A104-4659-BCA1-741252EC1BE3}" type="datetimeFigureOut">
               <a:rPr lang="ru-RU" smtClean="0"/>
-              <a:t>04.09.2019</a:t>
+              <a:t>10.09.2019</a:t>
             </a:fld>
             <a:endParaRPr lang="ru-RU"/>
           </a:p>
@@ -870,7 +872,7 @@
           <a:p>
             <a:fld id="{449F65A8-A104-4659-BCA1-741252EC1BE3}" type="datetimeFigureOut">
               <a:rPr lang="ru-RU" smtClean="0"/>
-              <a:t>04.09.2019</a:t>
+              <a:t>10.09.2019</a:t>
             </a:fld>
             <a:endParaRPr lang="ru-RU"/>
           </a:p>
@@ -1145,7 +1147,7 @@
           <a:p>
             <a:fld id="{449F65A8-A104-4659-BCA1-741252EC1BE3}" type="datetimeFigureOut">
               <a:rPr lang="ru-RU" smtClean="0"/>
-              <a:t>04.09.2019</a:t>
+              <a:t>10.09.2019</a:t>
             </a:fld>
             <a:endParaRPr lang="ru-RU"/>
           </a:p>
@@ -1410,7 +1412,7 @@
           <a:p>
             <a:fld id="{449F65A8-A104-4659-BCA1-741252EC1BE3}" type="datetimeFigureOut">
               <a:rPr lang="ru-RU" smtClean="0"/>
-              <a:t>04.09.2019</a:t>
+              <a:t>10.09.2019</a:t>
             </a:fld>
             <a:endParaRPr lang="ru-RU"/>
           </a:p>
@@ -1822,7 +1824,7 @@
           <a:p>
             <a:fld id="{449F65A8-A104-4659-BCA1-741252EC1BE3}" type="datetimeFigureOut">
               <a:rPr lang="ru-RU" smtClean="0"/>
-              <a:t>04.09.2019</a:t>
+              <a:t>10.09.2019</a:t>
             </a:fld>
             <a:endParaRPr lang="ru-RU"/>
           </a:p>
@@ -1963,7 +1965,7 @@
           <a:p>
             <a:fld id="{449F65A8-A104-4659-BCA1-741252EC1BE3}" type="datetimeFigureOut">
               <a:rPr lang="ru-RU" smtClean="0"/>
-              <a:t>04.09.2019</a:t>
+              <a:t>10.09.2019</a:t>
             </a:fld>
             <a:endParaRPr lang="ru-RU"/>
           </a:p>
@@ -2076,7 +2078,7 @@
           <a:p>
             <a:fld id="{449F65A8-A104-4659-BCA1-741252EC1BE3}" type="datetimeFigureOut">
               <a:rPr lang="ru-RU" smtClean="0"/>
-              <a:t>04.09.2019</a:t>
+              <a:t>10.09.2019</a:t>
             </a:fld>
             <a:endParaRPr lang="ru-RU"/>
           </a:p>
@@ -2387,7 +2389,7 @@
           <a:p>
             <a:fld id="{449F65A8-A104-4659-BCA1-741252EC1BE3}" type="datetimeFigureOut">
               <a:rPr lang="ru-RU" smtClean="0"/>
-              <a:t>04.09.2019</a:t>
+              <a:t>10.09.2019</a:t>
             </a:fld>
             <a:endParaRPr lang="ru-RU"/>
           </a:p>
@@ -2675,7 +2677,7 @@
           <a:p>
             <a:fld id="{449F65A8-A104-4659-BCA1-741252EC1BE3}" type="datetimeFigureOut">
               <a:rPr lang="ru-RU" smtClean="0"/>
-              <a:t>04.09.2019</a:t>
+              <a:t>10.09.2019</a:t>
             </a:fld>
             <a:endParaRPr lang="ru-RU"/>
           </a:p>
@@ -2916,7 +2918,7 @@
           <a:p>
             <a:fld id="{449F65A8-A104-4659-BCA1-741252EC1BE3}" type="datetimeFigureOut">
               <a:rPr lang="ru-RU" smtClean="0"/>
-              <a:t>04.09.2019</a:t>
+              <a:t>10.09.2019</a:t>
             </a:fld>
             <a:endParaRPr lang="ru-RU"/>
           </a:p>
@@ -3820,6 +3822,144 @@
 </p:sld>
 </file>
 
+<file path=ppt/slides/slide10.xml><?xml version="1.0" encoding="utf-8"?>
+<p:sld xmlns:a="http://schemas.openxmlformats.org/drawingml/2006/main" xmlns:r="http://schemas.openxmlformats.org/officeDocument/2006/relationships" xmlns:p="http://schemas.openxmlformats.org/presentationml/2006/main">
+  <p:cSld>
+    <p:spTree>
+      <p:nvGrpSpPr>
+        <p:cNvPr id="1" name=""/>
+        <p:cNvGrpSpPr/>
+        <p:nvPr/>
+      </p:nvGrpSpPr>
+      <p:grpSpPr>
+        <a:xfrm>
+          <a:off x="0" y="0"/>
+          <a:ext cx="0" cy="0"/>
+          <a:chOff x="0" y="0"/>
+          <a:chExt cx="0" cy="0"/>
+        </a:xfrm>
+      </p:grpSpPr>
+      <p:sp>
+        <p:nvSpPr>
+          <p:cNvPr id="2" name="Заголовок 1">
+            <a:extLst>
+              <a:ext uri="{FF2B5EF4-FFF2-40B4-BE49-F238E27FC236}">
+                <a16:creationId xmlns:a16="http://schemas.microsoft.com/office/drawing/2014/main" id="{8C83DA32-7C42-4F9A-BF62-A53F304D868D}"/>
+              </a:ext>
+            </a:extLst>
+          </p:cNvPr>
+          <p:cNvSpPr>
+            <a:spLocks noGrp="1"/>
+          </p:cNvSpPr>
+          <p:nvPr>
+            <p:ph type="title"/>
+          </p:nvPr>
+        </p:nvSpPr>
+        <p:spPr/>
+        <p:txBody>
+          <a:bodyPr/>
+          <a:lstStyle/>
+          <a:p>
+            <a:pPr algn="ctr"/>
+            <a:r>
+              <a:rPr lang="ru-RU" dirty="0"/>
+              <a:t>Ссылки</a:t>
+            </a:r>
+          </a:p>
+        </p:txBody>
+      </p:sp>
+      <p:sp>
+        <p:nvSpPr>
+          <p:cNvPr id="3" name="Объект 2">
+            <a:extLst>
+              <a:ext uri="{FF2B5EF4-FFF2-40B4-BE49-F238E27FC236}">
+                <a16:creationId xmlns:a16="http://schemas.microsoft.com/office/drawing/2014/main" id="{9396EB23-4167-4AE9-B114-0B3EC2CC586F}"/>
+              </a:ext>
+            </a:extLst>
+          </p:cNvPr>
+          <p:cNvSpPr>
+            <a:spLocks noGrp="1"/>
+          </p:cNvSpPr>
+          <p:nvPr>
+            <p:ph idx="1"/>
+          </p:nvPr>
+        </p:nvSpPr>
+        <p:spPr>
+          <a:xfrm>
+            <a:off x="838200" y="3047999"/>
+            <a:ext cx="10515600" cy="3128963"/>
+          </a:xfrm>
+        </p:spPr>
+        <p:txBody>
+          <a:bodyPr/>
+          <a:lstStyle/>
+          <a:p>
+            <a:r>
+              <a:rPr lang="en-US" dirty="0"/>
+              <a:t>REST API: </a:t>
+            </a:r>
+            <a:r>
+              <a:rPr lang="en-US" dirty="0">
+                <a:hlinkClick r:id="rId2"/>
+              </a:rPr>
+              <a:t>https://github.com/AppLoidx/helios-rest-api</a:t>
+            </a:r>
+            <a:endParaRPr lang="en-US" dirty="0"/>
+          </a:p>
+          <a:p>
+            <a:r>
+              <a:rPr lang="en-US" dirty="0"/>
+              <a:t>Backend: </a:t>
+            </a:r>
+            <a:r>
+              <a:rPr lang="en-US" dirty="0">
+                <a:hlinkClick r:id="rId3"/>
+              </a:rPr>
+              <a:t>https://github.com/AppLoidx/helios-backend</a:t>
+            </a:r>
+            <a:endParaRPr lang="en-US" dirty="0"/>
+          </a:p>
+          <a:p>
+            <a:r>
+              <a:rPr lang="en-US" dirty="0"/>
+              <a:t>Frontend: </a:t>
+            </a:r>
+            <a:r>
+              <a:rPr lang="en-US" dirty="0">
+                <a:hlinkClick r:id="rId4"/>
+              </a:rPr>
+              <a:t>https://github.com/AppLoidx/helios-front-end</a:t>
+            </a:r>
+            <a:endParaRPr lang="en-US" dirty="0"/>
+          </a:p>
+          <a:p>
+            <a:r>
+              <a:rPr lang="en-US" dirty="0"/>
+              <a:t>API Docs: </a:t>
+            </a:r>
+            <a:r>
+              <a:rPr lang="en-US" dirty="0">
+                <a:hlinkClick r:id="rId5"/>
+              </a:rPr>
+              <a:t>https://apploidx.github.io/helios-doc/</a:t>
+            </a:r>
+            <a:endParaRPr lang="ru-RU" dirty="0"/>
+          </a:p>
+        </p:txBody>
+      </p:sp>
+    </p:spTree>
+    <p:extLst>
+      <p:ext uri="{BB962C8B-B14F-4D97-AF65-F5344CB8AC3E}">
+        <p14:creationId xmlns:p14="http://schemas.microsoft.com/office/powerpoint/2010/main" val="949164365"/>
+      </p:ext>
+    </p:extLst>
+  </p:cSld>
+  <p:clrMapOvr>
+    <a:masterClrMapping/>
+  </p:clrMapOvr>
+</p:sld>
+</file>
+
 <file path=ppt/slides/slide2.xml><?xml version="1.0" encoding="utf-8"?>
 <p:sld xmlns:a="http://schemas.openxmlformats.org/drawingml/2006/main" xmlns:r="http://schemas.openxmlformats.org/officeDocument/2006/relationships" xmlns:p="http://schemas.openxmlformats.org/presentationml/2006/main">
   <p:cSld>
@@ -4632,10 +4772,10 @@
       </p:pic>
       <p:sp>
         <p:nvSpPr>
-          <p:cNvPr id="31" name="Прямоугольник 30">
-            <a:extLst>
-              <a:ext uri="{FF2B5EF4-FFF2-40B4-BE49-F238E27FC236}">
-                <a16:creationId xmlns:a16="http://schemas.microsoft.com/office/drawing/2014/main" id="{1A187158-1776-4C3A-A9A4-1BAB100A25A7}"/>
+          <p:cNvPr id="51" name="Полилиния: фигура 50">
+            <a:extLst>
+              <a:ext uri="{FF2B5EF4-FFF2-40B4-BE49-F238E27FC236}">
+                <a16:creationId xmlns:a16="http://schemas.microsoft.com/office/drawing/2014/main" id="{EE2CECB2-2517-4037-B618-D7DDD35A7EA6}"/>
               </a:ext>
             </a:extLst>
           </p:cNvPr>
@@ -4644,231 +4784,7 @@
         </p:nvSpPr>
         <p:spPr>
           <a:xfrm>
-            <a:off x="2415673" y="1597981"/>
-            <a:ext cx="2861494" cy="594803"/>
-          </a:xfrm>
-          <a:prstGeom prst="rect">
-            <a:avLst/>
-          </a:prstGeom>
-          <a:noFill/>
-          <a:ln w="19050">
-            <a:solidFill>
-              <a:srgbClr val="7030A0"/>
-            </a:solidFill>
-          </a:ln>
-        </p:spPr>
-        <p:style>
-          <a:lnRef idx="2">
-            <a:schemeClr val="accent1">
-              <a:shade val="50000"/>
-            </a:schemeClr>
-          </a:lnRef>
-          <a:fillRef idx="1">
-            <a:schemeClr val="accent1"/>
-          </a:fillRef>
-          <a:effectRef idx="0">
-            <a:schemeClr val="accent1"/>
-          </a:effectRef>
-          <a:fontRef idx="minor">
-            <a:schemeClr val="lt1"/>
-          </a:fontRef>
-        </p:style>
-        <p:txBody>
-          <a:bodyPr rtlCol="0" anchor="ctr"/>
-          <a:lstStyle/>
-          <a:p>
-            <a:pPr algn="ctr"/>
-            <a:endParaRPr lang="ru-RU"/>
-          </a:p>
-        </p:txBody>
-      </p:sp>
-      <p:cxnSp>
-        <p:nvCxnSpPr>
-          <p:cNvPr id="33" name="Прямая соединительная линия 32">
-            <a:extLst>
-              <a:ext uri="{FF2B5EF4-FFF2-40B4-BE49-F238E27FC236}">
-                <a16:creationId xmlns:a16="http://schemas.microsoft.com/office/drawing/2014/main" id="{333FB1B4-87E3-44C4-B5F4-65A4D3A812F6}"/>
-              </a:ext>
-            </a:extLst>
-          </p:cNvPr>
-          <p:cNvCxnSpPr>
-            <a:cxnSpLocks/>
-          </p:cNvCxnSpPr>
-          <p:nvPr/>
-        </p:nvCxnSpPr>
-        <p:spPr>
-          <a:xfrm flipV="1">
-            <a:off x="2415673" y="476190"/>
-            <a:ext cx="3180091" cy="1117219"/>
-          </a:xfrm>
-          <a:prstGeom prst="line">
-            <a:avLst/>
-          </a:prstGeom>
-          <a:ln w="19050">
-            <a:solidFill>
-              <a:srgbClr val="7030A0"/>
-            </a:solidFill>
-          </a:ln>
-        </p:spPr>
-        <p:style>
-          <a:lnRef idx="1">
-            <a:schemeClr val="accent1"/>
-          </a:lnRef>
-          <a:fillRef idx="0">
-            <a:schemeClr val="accent1"/>
-          </a:fillRef>
-          <a:effectRef idx="0">
-            <a:schemeClr val="accent1"/>
-          </a:effectRef>
-          <a:fontRef idx="minor">
-            <a:schemeClr val="tx1"/>
-          </a:fontRef>
-        </p:style>
-      </p:cxnSp>
-      <p:cxnSp>
-        <p:nvCxnSpPr>
-          <p:cNvPr id="35" name="Прямая соединительная линия 34">
-            <a:extLst>
-              <a:ext uri="{FF2B5EF4-FFF2-40B4-BE49-F238E27FC236}">
-                <a16:creationId xmlns:a16="http://schemas.microsoft.com/office/drawing/2014/main" id="{62717C6C-F96A-4A51-AF92-FC5B6F01F575}"/>
-              </a:ext>
-            </a:extLst>
-          </p:cNvPr>
-          <p:cNvCxnSpPr>
-            <a:cxnSpLocks/>
-          </p:cNvCxnSpPr>
-          <p:nvPr/>
-        </p:nvCxnSpPr>
-        <p:spPr>
-          <a:xfrm>
-            <a:off x="2415673" y="2192784"/>
-            <a:ext cx="3180091" cy="1716595"/>
-          </a:xfrm>
-          <a:prstGeom prst="line">
-            <a:avLst/>
-          </a:prstGeom>
-          <a:ln w="19050">
-            <a:solidFill>
-              <a:srgbClr val="6D7FCC"/>
-            </a:solidFill>
-          </a:ln>
-        </p:spPr>
-        <p:style>
-          <a:lnRef idx="1">
-            <a:schemeClr val="accent1"/>
-          </a:lnRef>
-          <a:fillRef idx="0">
-            <a:schemeClr val="accent1"/>
-          </a:fillRef>
-          <a:effectRef idx="0">
-            <a:schemeClr val="accent1"/>
-          </a:effectRef>
-          <a:fontRef idx="minor">
-            <a:schemeClr val="tx1"/>
-          </a:fontRef>
-        </p:style>
-      </p:cxnSp>
-      <p:cxnSp>
-        <p:nvCxnSpPr>
-          <p:cNvPr id="41" name="Прямая соединительная линия 40">
-            <a:extLst>
-              <a:ext uri="{FF2B5EF4-FFF2-40B4-BE49-F238E27FC236}">
-                <a16:creationId xmlns:a16="http://schemas.microsoft.com/office/drawing/2014/main" id="{01E850FE-2C48-4FBD-AD1D-398D8D4542A3}"/>
-              </a:ext>
-            </a:extLst>
-          </p:cNvPr>
-          <p:cNvCxnSpPr>
-            <a:cxnSpLocks/>
-          </p:cNvCxnSpPr>
-          <p:nvPr/>
-        </p:nvCxnSpPr>
-        <p:spPr>
-          <a:xfrm flipV="1">
-            <a:off x="5277167" y="471617"/>
-            <a:ext cx="3981133" cy="1120236"/>
-          </a:xfrm>
-          <a:prstGeom prst="line">
-            <a:avLst/>
-          </a:prstGeom>
-          <a:ln w="19050">
-            <a:solidFill>
-              <a:srgbClr val="7030A0"/>
-            </a:solidFill>
-          </a:ln>
-        </p:spPr>
-        <p:style>
-          <a:lnRef idx="1">
-            <a:schemeClr val="accent1"/>
-          </a:lnRef>
-          <a:fillRef idx="0">
-            <a:schemeClr val="accent1"/>
-          </a:fillRef>
-          <a:effectRef idx="0">
-            <a:schemeClr val="accent1"/>
-          </a:effectRef>
-          <a:fontRef idx="minor">
-            <a:schemeClr val="tx1"/>
-          </a:fontRef>
-        </p:style>
-      </p:cxnSp>
-      <p:cxnSp>
-        <p:nvCxnSpPr>
-          <p:cNvPr id="43" name="Прямая соединительная линия 42">
-            <a:extLst>
-              <a:ext uri="{FF2B5EF4-FFF2-40B4-BE49-F238E27FC236}">
-                <a16:creationId xmlns:a16="http://schemas.microsoft.com/office/drawing/2014/main" id="{E2BAA3E6-DD73-49A0-8381-7A18CD99715E}"/>
-              </a:ext>
-            </a:extLst>
-          </p:cNvPr>
-          <p:cNvCxnSpPr>
-            <a:cxnSpLocks/>
-          </p:cNvCxnSpPr>
-          <p:nvPr/>
-        </p:nvCxnSpPr>
-        <p:spPr>
-          <a:xfrm>
-            <a:off x="5277167" y="2192784"/>
-            <a:ext cx="4499160" cy="1716595"/>
-          </a:xfrm>
-          <a:prstGeom prst="line">
-            <a:avLst/>
-          </a:prstGeom>
-          <a:ln w="19050">
-            <a:solidFill>
-              <a:srgbClr val="7030A0"/>
-            </a:solidFill>
-          </a:ln>
-        </p:spPr>
-        <p:style>
-          <a:lnRef idx="1">
-            <a:schemeClr val="accent1"/>
-          </a:lnRef>
-          <a:fillRef idx="0">
-            <a:schemeClr val="accent1"/>
-          </a:fillRef>
-          <a:effectRef idx="0">
-            <a:schemeClr val="accent1"/>
-          </a:effectRef>
-          <a:fontRef idx="minor">
-            <a:schemeClr val="tx1"/>
-          </a:fontRef>
-        </p:style>
-      </p:cxnSp>
-      <p:sp>
-        <p:nvSpPr>
-          <p:cNvPr id="51" name="Полилиния: фигура 50">
-            <a:extLst>
-              <a:ext uri="{FF2B5EF4-FFF2-40B4-BE49-F238E27FC236}">
-                <a16:creationId xmlns:a16="http://schemas.microsoft.com/office/drawing/2014/main" id="{EE2CECB2-2517-4037-B618-D7DDD35A7EA6}"/>
-              </a:ext>
-            </a:extLst>
-          </p:cNvPr>
-          <p:cNvSpPr/>
-          <p:nvPr/>
-        </p:nvSpPr>
-        <p:spPr>
-          <a:xfrm>
-            <a:off x="2419350" y="2190750"/>
+            <a:off x="2414259" y="2202888"/>
             <a:ext cx="3181350" cy="1714500"/>
           </a:xfrm>
           <a:custGeom>
@@ -4973,7 +4889,7 @@
         </p:nvSpPr>
         <p:spPr>
           <a:xfrm>
-            <a:off x="2416175" y="473075"/>
+            <a:off x="2406239" y="473253"/>
             <a:ext cx="3178175" cy="1123950"/>
           </a:xfrm>
           <a:custGeom>
@@ -5078,8 +4994,8 @@
         </p:nvSpPr>
         <p:spPr>
           <a:xfrm>
-            <a:off x="2415673" y="1595438"/>
-            <a:ext cx="2862908" cy="595790"/>
+            <a:off x="2422525" y="1591853"/>
+            <a:ext cx="2862908" cy="606463"/>
           </a:xfrm>
           <a:prstGeom prst="rect">
             <a:avLst/>
@@ -5608,6 +5524,527 @@
   <p:clrMapOvr>
     <a:masterClrMapping/>
   </p:clrMapOvr>
+  <p:timing>
+    <p:tnLst>
+      <p:par>
+        <p:cTn id="1" dur="indefinite" restart="never" nodeType="tmRoot">
+          <p:childTnLst>
+            <p:seq concurrent="1" nextAc="seek">
+              <p:cTn id="2" dur="indefinite" nodeType="mainSeq">
+                <p:childTnLst>
+                  <p:par>
+                    <p:cTn id="3" fill="hold">
+                      <p:stCondLst>
+                        <p:cond delay="indefinite"/>
+                      </p:stCondLst>
+                      <p:childTnLst>
+                        <p:par>
+                          <p:cTn id="4" fill="hold">
+                            <p:stCondLst>
+                              <p:cond delay="0"/>
+                            </p:stCondLst>
+                            <p:childTnLst>
+                              <p:par>
+                                <p:cTn id="5" presetID="42" presetClass="entr" presetSubtype="0" fill="hold" nodeType="clickEffect">
+                                  <p:stCondLst>
+                                    <p:cond delay="0"/>
+                                  </p:stCondLst>
+                                  <p:childTnLst>
+                                    <p:set>
+                                      <p:cBhvr>
+                                        <p:cTn id="6" dur="1" fill="hold">
+                                          <p:stCondLst>
+                                            <p:cond delay="0"/>
+                                          </p:stCondLst>
+                                        </p:cTn>
+                                        <p:tgtEl>
+                                          <p:spTgt spid="5"/>
+                                        </p:tgtEl>
+                                        <p:attrNameLst>
+                                          <p:attrName>style.visibility</p:attrName>
+                                        </p:attrNameLst>
+                                      </p:cBhvr>
+                                      <p:to>
+                                        <p:strVal val="visible"/>
+                                      </p:to>
+                                    </p:set>
+                                    <p:animEffect transition="in" filter="fade">
+                                      <p:cBhvr>
+                                        <p:cTn id="7" dur="1000"/>
+                                        <p:tgtEl>
+                                          <p:spTgt spid="5"/>
+                                        </p:tgtEl>
+                                      </p:cBhvr>
+                                    </p:animEffect>
+                                    <p:anim calcmode="lin" valueType="num">
+                                      <p:cBhvr>
+                                        <p:cTn id="8" dur="1000" fill="hold"/>
+                                        <p:tgtEl>
+                                          <p:spTgt spid="5"/>
+                                        </p:tgtEl>
+                                        <p:attrNameLst>
+                                          <p:attrName>ppt_x</p:attrName>
+                                        </p:attrNameLst>
+                                      </p:cBhvr>
+                                      <p:tavLst>
+                                        <p:tav tm="0">
+                                          <p:val>
+                                            <p:strVal val="#ppt_x"/>
+                                          </p:val>
+                                        </p:tav>
+                                        <p:tav tm="100000">
+                                          <p:val>
+                                            <p:strVal val="#ppt_x"/>
+                                          </p:val>
+                                        </p:tav>
+                                      </p:tavLst>
+                                    </p:anim>
+                                    <p:anim calcmode="lin" valueType="num">
+                                      <p:cBhvr>
+                                        <p:cTn id="9" dur="1000" fill="hold"/>
+                                        <p:tgtEl>
+                                          <p:spTgt spid="5"/>
+                                        </p:tgtEl>
+                                        <p:attrNameLst>
+                                          <p:attrName>ppt_y</p:attrName>
+                                        </p:attrNameLst>
+                                      </p:cBhvr>
+                                      <p:tavLst>
+                                        <p:tav tm="0">
+                                          <p:val>
+                                            <p:strVal val="#ppt_y+.1"/>
+                                          </p:val>
+                                        </p:tav>
+                                        <p:tav tm="100000">
+                                          <p:val>
+                                            <p:strVal val="#ppt_y"/>
+                                          </p:val>
+                                        </p:tav>
+                                      </p:tavLst>
+                                    </p:anim>
+                                  </p:childTnLst>
+                                </p:cTn>
+                              </p:par>
+                            </p:childTnLst>
+                          </p:cTn>
+                        </p:par>
+                      </p:childTnLst>
+                    </p:cTn>
+                  </p:par>
+                  <p:par>
+                    <p:cTn id="10" fill="hold">
+                      <p:stCondLst>
+                        <p:cond delay="indefinite"/>
+                      </p:stCondLst>
+                      <p:childTnLst>
+                        <p:par>
+                          <p:cTn id="11" fill="hold">
+                            <p:stCondLst>
+                              <p:cond delay="0"/>
+                            </p:stCondLst>
+                            <p:childTnLst>
+                              <p:par>
+                                <p:cTn id="12" presetID="10" presetClass="entr" presetSubtype="0" fill="hold" nodeType="clickEffect">
+                                  <p:stCondLst>
+                                    <p:cond delay="0"/>
+                                  </p:stCondLst>
+                                  <p:childTnLst>
+                                    <p:set>
+                                      <p:cBhvr>
+                                        <p:cTn id="13" dur="1" fill="hold">
+                                          <p:stCondLst>
+                                            <p:cond delay="0"/>
+                                          </p:stCondLst>
+                                        </p:cTn>
+                                        <p:tgtEl>
+                                          <p:spTgt spid="15"/>
+                                        </p:tgtEl>
+                                        <p:attrNameLst>
+                                          <p:attrName>style.visibility</p:attrName>
+                                        </p:attrNameLst>
+                                      </p:cBhvr>
+                                      <p:to>
+                                        <p:strVal val="visible"/>
+                                      </p:to>
+                                    </p:set>
+                                    <p:animEffect transition="in" filter="fade">
+                                      <p:cBhvr>
+                                        <p:cTn id="14" dur="500"/>
+                                        <p:tgtEl>
+                                          <p:spTgt spid="15"/>
+                                        </p:tgtEl>
+                                      </p:cBhvr>
+                                    </p:animEffect>
+                                  </p:childTnLst>
+                                </p:cTn>
+                              </p:par>
+                              <p:par>
+                                <p:cTn id="15" presetID="10" presetClass="entr" presetSubtype="0" fill="hold" nodeType="withEffect">
+                                  <p:stCondLst>
+                                    <p:cond delay="0"/>
+                                  </p:stCondLst>
+                                  <p:childTnLst>
+                                    <p:set>
+                                      <p:cBhvr>
+                                        <p:cTn id="16" dur="1" fill="hold">
+                                          <p:stCondLst>
+                                            <p:cond delay="0"/>
+                                          </p:stCondLst>
+                                        </p:cTn>
+                                        <p:tgtEl>
+                                          <p:spTgt spid="23"/>
+                                        </p:tgtEl>
+                                        <p:attrNameLst>
+                                          <p:attrName>style.visibility</p:attrName>
+                                        </p:attrNameLst>
+                                      </p:cBhvr>
+                                      <p:to>
+                                        <p:strVal val="visible"/>
+                                      </p:to>
+                                    </p:set>
+                                    <p:animEffect transition="in" filter="fade">
+                                      <p:cBhvr>
+                                        <p:cTn id="17" dur="500"/>
+                                        <p:tgtEl>
+                                          <p:spTgt spid="23"/>
+                                        </p:tgtEl>
+                                      </p:cBhvr>
+                                    </p:animEffect>
+                                  </p:childTnLst>
+                                </p:cTn>
+                              </p:par>
+                              <p:par>
+                                <p:cTn id="18" presetID="10" presetClass="entr" presetSubtype="0" fill="hold" grpId="0" nodeType="withEffect">
+                                  <p:stCondLst>
+                                    <p:cond delay="0"/>
+                                  </p:stCondLst>
+                                  <p:childTnLst>
+                                    <p:set>
+                                      <p:cBhvr>
+                                        <p:cTn id="19" dur="1" fill="hold">
+                                          <p:stCondLst>
+                                            <p:cond delay="0"/>
+                                          </p:stCondLst>
+                                        </p:cTn>
+                                        <p:tgtEl>
+                                          <p:spTgt spid="9"/>
+                                        </p:tgtEl>
+                                        <p:attrNameLst>
+                                          <p:attrName>style.visibility</p:attrName>
+                                        </p:attrNameLst>
+                                      </p:cBhvr>
+                                      <p:to>
+                                        <p:strVal val="visible"/>
+                                      </p:to>
+                                    </p:set>
+                                    <p:animEffect transition="in" filter="fade">
+                                      <p:cBhvr>
+                                        <p:cTn id="20" dur="500"/>
+                                        <p:tgtEl>
+                                          <p:spTgt spid="9"/>
+                                        </p:tgtEl>
+                                      </p:cBhvr>
+                                    </p:animEffect>
+                                  </p:childTnLst>
+                                </p:cTn>
+                              </p:par>
+                              <p:par>
+                                <p:cTn id="21" presetID="10" presetClass="entr" presetSubtype="0" fill="hold" nodeType="withEffect">
+                                  <p:stCondLst>
+                                    <p:cond delay="0"/>
+                                  </p:stCondLst>
+                                  <p:childTnLst>
+                                    <p:set>
+                                      <p:cBhvr>
+                                        <p:cTn id="22" dur="1" fill="hold">
+                                          <p:stCondLst>
+                                            <p:cond delay="0"/>
+                                          </p:stCondLst>
+                                        </p:cTn>
+                                        <p:tgtEl>
+                                          <p:spTgt spid="22"/>
+                                        </p:tgtEl>
+                                        <p:attrNameLst>
+                                          <p:attrName>style.visibility</p:attrName>
+                                        </p:attrNameLst>
+                                      </p:cBhvr>
+                                      <p:to>
+                                        <p:strVal val="visible"/>
+                                      </p:to>
+                                    </p:set>
+                                    <p:animEffect transition="in" filter="fade">
+                                      <p:cBhvr>
+                                        <p:cTn id="23" dur="500"/>
+                                        <p:tgtEl>
+                                          <p:spTgt spid="22"/>
+                                        </p:tgtEl>
+                                      </p:cBhvr>
+                                    </p:animEffect>
+                                  </p:childTnLst>
+                                </p:cTn>
+                              </p:par>
+                              <p:par>
+                                <p:cTn id="24" presetID="10" presetClass="entr" presetSubtype="0" fill="hold" nodeType="withEffect">
+                                  <p:stCondLst>
+                                    <p:cond delay="0"/>
+                                  </p:stCondLst>
+                                  <p:childTnLst>
+                                    <p:set>
+                                      <p:cBhvr>
+                                        <p:cTn id="25" dur="1" fill="hold">
+                                          <p:stCondLst>
+                                            <p:cond delay="0"/>
+                                          </p:stCondLst>
+                                        </p:cTn>
+                                        <p:tgtEl>
+                                          <p:spTgt spid="18"/>
+                                        </p:tgtEl>
+                                        <p:attrNameLst>
+                                          <p:attrName>style.visibility</p:attrName>
+                                        </p:attrNameLst>
+                                      </p:cBhvr>
+                                      <p:to>
+                                        <p:strVal val="visible"/>
+                                      </p:to>
+                                    </p:set>
+                                    <p:animEffect transition="in" filter="fade">
+                                      <p:cBhvr>
+                                        <p:cTn id="26" dur="500"/>
+                                        <p:tgtEl>
+                                          <p:spTgt spid="18"/>
+                                        </p:tgtEl>
+                                      </p:cBhvr>
+                                    </p:animEffect>
+                                  </p:childTnLst>
+                                </p:cTn>
+                              </p:par>
+                              <p:par>
+                                <p:cTn id="27" presetID="10" presetClass="entr" presetSubtype="0" fill="hold" nodeType="withEffect">
+                                  <p:stCondLst>
+                                    <p:cond delay="0"/>
+                                  </p:stCondLst>
+                                  <p:childTnLst>
+                                    <p:set>
+                                      <p:cBhvr>
+                                        <p:cTn id="28" dur="1" fill="hold">
+                                          <p:stCondLst>
+                                            <p:cond delay="0"/>
+                                          </p:stCondLst>
+                                        </p:cTn>
+                                        <p:tgtEl>
+                                          <p:spTgt spid="7"/>
+                                        </p:tgtEl>
+                                        <p:attrNameLst>
+                                          <p:attrName>style.visibility</p:attrName>
+                                        </p:attrNameLst>
+                                      </p:cBhvr>
+                                      <p:to>
+                                        <p:strVal val="visible"/>
+                                      </p:to>
+                                    </p:set>
+                                    <p:animEffect transition="in" filter="fade">
+                                      <p:cBhvr>
+                                        <p:cTn id="29" dur="500"/>
+                                        <p:tgtEl>
+                                          <p:spTgt spid="7"/>
+                                        </p:tgtEl>
+                                      </p:cBhvr>
+                                    </p:animEffect>
+                                  </p:childTnLst>
+                                </p:cTn>
+                              </p:par>
+                            </p:childTnLst>
+                          </p:cTn>
+                        </p:par>
+                      </p:childTnLst>
+                    </p:cTn>
+                  </p:par>
+                  <p:par>
+                    <p:cTn id="30" fill="hold">
+                      <p:stCondLst>
+                        <p:cond delay="indefinite"/>
+                      </p:stCondLst>
+                      <p:childTnLst>
+                        <p:par>
+                          <p:cTn id="31" fill="hold">
+                            <p:stCondLst>
+                              <p:cond delay="0"/>
+                            </p:stCondLst>
+                            <p:childTnLst>
+                              <p:par>
+                                <p:cTn id="32" presetID="10" presetClass="entr" presetSubtype="0" fill="hold" grpId="0" nodeType="clickEffect">
+                                  <p:stCondLst>
+                                    <p:cond delay="0"/>
+                                  </p:stCondLst>
+                                  <p:childTnLst>
+                                    <p:set>
+                                      <p:cBhvr>
+                                        <p:cTn id="33" dur="1" fill="hold">
+                                          <p:stCondLst>
+                                            <p:cond delay="0"/>
+                                          </p:stCondLst>
+                                        </p:cTn>
+                                        <p:tgtEl>
+                                          <p:spTgt spid="52"/>
+                                        </p:tgtEl>
+                                        <p:attrNameLst>
+                                          <p:attrName>style.visibility</p:attrName>
+                                        </p:attrNameLst>
+                                      </p:cBhvr>
+                                      <p:to>
+                                        <p:strVal val="visible"/>
+                                      </p:to>
+                                    </p:set>
+                                    <p:animEffect transition="in" filter="fade">
+                                      <p:cBhvr>
+                                        <p:cTn id="34" dur="500"/>
+                                        <p:tgtEl>
+                                          <p:spTgt spid="52"/>
+                                        </p:tgtEl>
+                                      </p:cBhvr>
+                                    </p:animEffect>
+                                  </p:childTnLst>
+                                </p:cTn>
+                              </p:par>
+                              <p:par>
+                                <p:cTn id="35" presetID="10" presetClass="entr" presetSubtype="0" fill="hold" grpId="0" nodeType="withEffect">
+                                  <p:stCondLst>
+                                    <p:cond delay="0"/>
+                                  </p:stCondLst>
+                                  <p:childTnLst>
+                                    <p:set>
+                                      <p:cBhvr>
+                                        <p:cTn id="36" dur="1" fill="hold">
+                                          <p:stCondLst>
+                                            <p:cond delay="0"/>
+                                          </p:stCondLst>
+                                        </p:cTn>
+                                        <p:tgtEl>
+                                          <p:spTgt spid="51"/>
+                                        </p:tgtEl>
+                                        <p:attrNameLst>
+                                          <p:attrName>style.visibility</p:attrName>
+                                        </p:attrNameLst>
+                                      </p:cBhvr>
+                                      <p:to>
+                                        <p:strVal val="visible"/>
+                                      </p:to>
+                                    </p:set>
+                                    <p:animEffect transition="in" filter="fade">
+                                      <p:cBhvr>
+                                        <p:cTn id="37" dur="500"/>
+                                        <p:tgtEl>
+                                          <p:spTgt spid="51"/>
+                                        </p:tgtEl>
+                                      </p:cBhvr>
+                                    </p:animEffect>
+                                  </p:childTnLst>
+                                </p:cTn>
+                              </p:par>
+                              <p:par>
+                                <p:cTn id="38" presetID="10" presetClass="entr" presetSubtype="0" fill="hold" nodeType="withEffect">
+                                  <p:stCondLst>
+                                    <p:cond delay="0"/>
+                                  </p:stCondLst>
+                                  <p:childTnLst>
+                                    <p:set>
+                                      <p:cBhvr>
+                                        <p:cTn id="39" dur="1" fill="hold">
+                                          <p:stCondLst>
+                                            <p:cond delay="0"/>
+                                          </p:stCondLst>
+                                        </p:cTn>
+                                        <p:tgtEl>
+                                          <p:spTgt spid="30"/>
+                                        </p:tgtEl>
+                                        <p:attrNameLst>
+                                          <p:attrName>style.visibility</p:attrName>
+                                        </p:attrNameLst>
+                                      </p:cBhvr>
+                                      <p:to>
+                                        <p:strVal val="visible"/>
+                                      </p:to>
+                                    </p:set>
+                                    <p:animEffect transition="in" filter="fade">
+                                      <p:cBhvr>
+                                        <p:cTn id="40" dur="500"/>
+                                        <p:tgtEl>
+                                          <p:spTgt spid="30"/>
+                                        </p:tgtEl>
+                                      </p:cBhvr>
+                                    </p:animEffect>
+                                  </p:childTnLst>
+                                </p:cTn>
+                              </p:par>
+                              <p:par>
+                                <p:cTn id="41" presetID="10" presetClass="entr" presetSubtype="0" fill="hold" grpId="0" nodeType="withEffect">
+                                  <p:stCondLst>
+                                    <p:cond delay="0"/>
+                                  </p:stCondLst>
+                                  <p:childTnLst>
+                                    <p:set>
+                                      <p:cBhvr>
+                                        <p:cTn id="42" dur="1" fill="hold">
+                                          <p:stCondLst>
+                                            <p:cond delay="0"/>
+                                          </p:stCondLst>
+                                        </p:cTn>
+                                        <p:tgtEl>
+                                          <p:spTgt spid="53"/>
+                                        </p:tgtEl>
+                                        <p:attrNameLst>
+                                          <p:attrName>style.visibility</p:attrName>
+                                        </p:attrNameLst>
+                                      </p:cBhvr>
+                                      <p:to>
+                                        <p:strVal val="visible"/>
+                                      </p:to>
+                                    </p:set>
+                                    <p:animEffect transition="in" filter="fade">
+                                      <p:cBhvr>
+                                        <p:cTn id="43" dur="500"/>
+                                        <p:tgtEl>
+                                          <p:spTgt spid="53"/>
+                                        </p:tgtEl>
+                                      </p:cBhvr>
+                                    </p:animEffect>
+                                  </p:childTnLst>
+                                </p:cTn>
+                              </p:par>
+                            </p:childTnLst>
+                          </p:cTn>
+                        </p:par>
+                      </p:childTnLst>
+                    </p:cTn>
+                  </p:par>
+                </p:childTnLst>
+              </p:cTn>
+              <p:prevCondLst>
+                <p:cond evt="onPrev" delay="0">
+                  <p:tgtEl>
+                    <p:sldTgt/>
+                  </p:tgtEl>
+                </p:cond>
+              </p:prevCondLst>
+              <p:nextCondLst>
+                <p:cond evt="onNext" delay="0">
+                  <p:tgtEl>
+                    <p:sldTgt/>
+                  </p:tgtEl>
+                </p:cond>
+              </p:nextCondLst>
+            </p:seq>
+          </p:childTnLst>
+        </p:cTn>
+      </p:par>
+    </p:tnLst>
+    <p:bldLst>
+      <p:bldP spid="9" grpId="0" animBg="1"/>
+      <p:bldP spid="51" grpId="0" animBg="1"/>
+      <p:bldP spid="52" grpId="0" animBg="1"/>
+      <p:bldP spid="53" grpId="0" animBg="1"/>
+    </p:bldLst>
+  </p:timing>
 </p:sld>
 </file>
 
@@ -5881,10 +6318,499 @@
   <p:clrMapOvr>
     <a:masterClrMapping/>
   </p:clrMapOvr>
+  <p:timing>
+    <p:tnLst>
+      <p:par>
+        <p:cTn id="1" dur="indefinite" restart="never" nodeType="tmRoot">
+          <p:childTnLst>
+            <p:seq concurrent="1" nextAc="seek">
+              <p:cTn id="2" dur="indefinite" nodeType="mainSeq">
+                <p:childTnLst>
+                  <p:par>
+                    <p:cTn id="3" fill="hold">
+                      <p:stCondLst>
+                        <p:cond delay="indefinite"/>
+                        <p:cond evt="onBegin" delay="0">
+                          <p:tn val="2"/>
+                        </p:cond>
+                      </p:stCondLst>
+                      <p:childTnLst>
+                        <p:par>
+                          <p:cTn id="4" fill="hold">
+                            <p:stCondLst>
+                              <p:cond delay="0"/>
+                            </p:stCondLst>
+                            <p:childTnLst>
+                              <p:par>
+                                <p:cTn id="5" presetID="42" presetClass="entr" presetSubtype="0" fill="hold" nodeType="withEffect">
+                                  <p:stCondLst>
+                                    <p:cond delay="0"/>
+                                  </p:stCondLst>
+                                  <p:childTnLst>
+                                    <p:set>
+                                      <p:cBhvr>
+                                        <p:cTn id="6" dur="1" fill="hold">
+                                          <p:stCondLst>
+                                            <p:cond delay="0"/>
+                                          </p:stCondLst>
+                                        </p:cTn>
+                                        <p:tgtEl>
+                                          <p:spTgt spid="30"/>
+                                        </p:tgtEl>
+                                        <p:attrNameLst>
+                                          <p:attrName>style.visibility</p:attrName>
+                                        </p:attrNameLst>
+                                      </p:cBhvr>
+                                      <p:to>
+                                        <p:strVal val="visible"/>
+                                      </p:to>
+                                    </p:set>
+                                    <p:animEffect transition="in" filter="fade">
+                                      <p:cBhvr>
+                                        <p:cTn id="7" dur="1000"/>
+                                        <p:tgtEl>
+                                          <p:spTgt spid="30"/>
+                                        </p:tgtEl>
+                                      </p:cBhvr>
+                                    </p:animEffect>
+                                    <p:anim calcmode="lin" valueType="num">
+                                      <p:cBhvr>
+                                        <p:cTn id="8" dur="1000" fill="hold"/>
+                                        <p:tgtEl>
+                                          <p:spTgt spid="30"/>
+                                        </p:tgtEl>
+                                        <p:attrNameLst>
+                                          <p:attrName>ppt_x</p:attrName>
+                                        </p:attrNameLst>
+                                      </p:cBhvr>
+                                      <p:tavLst>
+                                        <p:tav tm="0">
+                                          <p:val>
+                                            <p:strVal val="#ppt_x"/>
+                                          </p:val>
+                                        </p:tav>
+                                        <p:tav tm="100000">
+                                          <p:val>
+                                            <p:strVal val="#ppt_x"/>
+                                          </p:val>
+                                        </p:tav>
+                                      </p:tavLst>
+                                    </p:anim>
+                                    <p:anim calcmode="lin" valueType="num">
+                                      <p:cBhvr>
+                                        <p:cTn id="9" dur="1000" fill="hold"/>
+                                        <p:tgtEl>
+                                          <p:spTgt spid="30"/>
+                                        </p:tgtEl>
+                                        <p:attrNameLst>
+                                          <p:attrName>ppt_y</p:attrName>
+                                        </p:attrNameLst>
+                                      </p:cBhvr>
+                                      <p:tavLst>
+                                        <p:tav tm="0">
+                                          <p:val>
+                                            <p:strVal val="#ppt_y+.1"/>
+                                          </p:val>
+                                        </p:tav>
+                                        <p:tav tm="100000">
+                                          <p:val>
+                                            <p:strVal val="#ppt_y"/>
+                                          </p:val>
+                                        </p:tav>
+                                      </p:tavLst>
+                                    </p:anim>
+                                  </p:childTnLst>
+                                </p:cTn>
+                              </p:par>
+                              <p:par>
+                                <p:cTn id="10" presetID="42" presetClass="entr" presetSubtype="0" fill="hold" nodeType="withEffect">
+                                  <p:stCondLst>
+                                    <p:cond delay="0"/>
+                                  </p:stCondLst>
+                                  <p:childTnLst>
+                                    <p:set>
+                                      <p:cBhvr>
+                                        <p:cTn id="11" dur="1" fill="hold">
+                                          <p:stCondLst>
+                                            <p:cond delay="0"/>
+                                          </p:stCondLst>
+                                        </p:cTn>
+                                        <p:tgtEl>
+                                          <p:spTgt spid="35"/>
+                                        </p:tgtEl>
+                                        <p:attrNameLst>
+                                          <p:attrName>style.visibility</p:attrName>
+                                        </p:attrNameLst>
+                                      </p:cBhvr>
+                                      <p:to>
+                                        <p:strVal val="visible"/>
+                                      </p:to>
+                                    </p:set>
+                                    <p:animEffect transition="in" filter="fade">
+                                      <p:cBhvr>
+                                        <p:cTn id="12" dur="1000"/>
+                                        <p:tgtEl>
+                                          <p:spTgt spid="35"/>
+                                        </p:tgtEl>
+                                      </p:cBhvr>
+                                    </p:animEffect>
+                                    <p:anim calcmode="lin" valueType="num">
+                                      <p:cBhvr>
+                                        <p:cTn id="13" dur="1000" fill="hold"/>
+                                        <p:tgtEl>
+                                          <p:spTgt spid="35"/>
+                                        </p:tgtEl>
+                                        <p:attrNameLst>
+                                          <p:attrName>ppt_x</p:attrName>
+                                        </p:attrNameLst>
+                                      </p:cBhvr>
+                                      <p:tavLst>
+                                        <p:tav tm="0">
+                                          <p:val>
+                                            <p:strVal val="#ppt_x"/>
+                                          </p:val>
+                                        </p:tav>
+                                        <p:tav tm="100000">
+                                          <p:val>
+                                            <p:strVal val="#ppt_x"/>
+                                          </p:val>
+                                        </p:tav>
+                                      </p:tavLst>
+                                    </p:anim>
+                                    <p:anim calcmode="lin" valueType="num">
+                                      <p:cBhvr>
+                                        <p:cTn id="14" dur="1000" fill="hold"/>
+                                        <p:tgtEl>
+                                          <p:spTgt spid="35"/>
+                                        </p:tgtEl>
+                                        <p:attrNameLst>
+                                          <p:attrName>ppt_y</p:attrName>
+                                        </p:attrNameLst>
+                                      </p:cBhvr>
+                                      <p:tavLst>
+                                        <p:tav tm="0">
+                                          <p:val>
+                                            <p:strVal val="#ppt_y+.1"/>
+                                          </p:val>
+                                        </p:tav>
+                                        <p:tav tm="100000">
+                                          <p:val>
+                                            <p:strVal val="#ppt_y"/>
+                                          </p:val>
+                                        </p:tav>
+                                      </p:tavLst>
+                                    </p:anim>
+                                  </p:childTnLst>
+                                </p:cTn>
+                              </p:par>
+                              <p:par>
+                                <p:cTn id="15" presetID="42" presetClass="entr" presetSubtype="0" fill="hold" nodeType="withEffect">
+                                  <p:stCondLst>
+                                    <p:cond delay="0"/>
+                                  </p:stCondLst>
+                                  <p:childTnLst>
+                                    <p:set>
+                                      <p:cBhvr>
+                                        <p:cTn id="16" dur="1" fill="hold">
+                                          <p:stCondLst>
+                                            <p:cond delay="0"/>
+                                          </p:stCondLst>
+                                        </p:cTn>
+                                        <p:tgtEl>
+                                          <p:spTgt spid="49"/>
+                                        </p:tgtEl>
+                                        <p:attrNameLst>
+                                          <p:attrName>style.visibility</p:attrName>
+                                        </p:attrNameLst>
+                                      </p:cBhvr>
+                                      <p:to>
+                                        <p:strVal val="visible"/>
+                                      </p:to>
+                                    </p:set>
+                                    <p:animEffect transition="in" filter="fade">
+                                      <p:cBhvr>
+                                        <p:cTn id="17" dur="1000"/>
+                                        <p:tgtEl>
+                                          <p:spTgt spid="49"/>
+                                        </p:tgtEl>
+                                      </p:cBhvr>
+                                    </p:animEffect>
+                                    <p:anim calcmode="lin" valueType="num">
+                                      <p:cBhvr>
+                                        <p:cTn id="18" dur="1000" fill="hold"/>
+                                        <p:tgtEl>
+                                          <p:spTgt spid="49"/>
+                                        </p:tgtEl>
+                                        <p:attrNameLst>
+                                          <p:attrName>ppt_x</p:attrName>
+                                        </p:attrNameLst>
+                                      </p:cBhvr>
+                                      <p:tavLst>
+                                        <p:tav tm="0">
+                                          <p:val>
+                                            <p:strVal val="#ppt_x"/>
+                                          </p:val>
+                                        </p:tav>
+                                        <p:tav tm="100000">
+                                          <p:val>
+                                            <p:strVal val="#ppt_x"/>
+                                          </p:val>
+                                        </p:tav>
+                                      </p:tavLst>
+                                    </p:anim>
+                                    <p:anim calcmode="lin" valueType="num">
+                                      <p:cBhvr>
+                                        <p:cTn id="19" dur="1000" fill="hold"/>
+                                        <p:tgtEl>
+                                          <p:spTgt spid="49"/>
+                                        </p:tgtEl>
+                                        <p:attrNameLst>
+                                          <p:attrName>ppt_y</p:attrName>
+                                        </p:attrNameLst>
+                                      </p:cBhvr>
+                                      <p:tavLst>
+                                        <p:tav tm="0">
+                                          <p:val>
+                                            <p:strVal val="#ppt_y+.1"/>
+                                          </p:val>
+                                        </p:tav>
+                                        <p:tav tm="100000">
+                                          <p:val>
+                                            <p:strVal val="#ppt_y"/>
+                                          </p:val>
+                                        </p:tav>
+                                      </p:tavLst>
+                                    </p:anim>
+                                  </p:childTnLst>
+                                </p:cTn>
+                              </p:par>
+                            </p:childTnLst>
+                          </p:cTn>
+                        </p:par>
+                      </p:childTnLst>
+                    </p:cTn>
+                  </p:par>
+                </p:childTnLst>
+              </p:cTn>
+              <p:prevCondLst>
+                <p:cond evt="onPrev" delay="0">
+                  <p:tgtEl>
+                    <p:sldTgt/>
+                  </p:tgtEl>
+                </p:cond>
+              </p:prevCondLst>
+              <p:nextCondLst>
+                <p:cond evt="onNext" delay="0">
+                  <p:tgtEl>
+                    <p:sldTgt/>
+                  </p:tgtEl>
+                </p:cond>
+              </p:nextCondLst>
+            </p:seq>
+          </p:childTnLst>
+        </p:cTn>
+      </p:par>
+    </p:tnLst>
+  </p:timing>
 </p:sld>
 </file>
 
 <file path=ppt/slides/slide6.xml><?xml version="1.0" encoding="utf-8"?>
+<p:sld xmlns:a="http://schemas.openxmlformats.org/drawingml/2006/main" xmlns:r="http://schemas.openxmlformats.org/officeDocument/2006/relationships" xmlns:p="http://schemas.openxmlformats.org/presentationml/2006/main">
+  <p:cSld>
+    <p:bg>
+      <p:bgPr>
+        <a:solidFill>
+          <a:schemeClr val="bg1"/>
+        </a:solidFill>
+        <a:effectLst/>
+      </p:bgPr>
+    </p:bg>
+    <p:spTree>
+      <p:nvGrpSpPr>
+        <p:cNvPr id="1" name=""/>
+        <p:cNvGrpSpPr/>
+        <p:nvPr/>
+      </p:nvGrpSpPr>
+      <p:grpSpPr>
+        <a:xfrm>
+          <a:off x="0" y="0"/>
+          <a:ext cx="0" cy="0"/>
+          <a:chOff x="0" y="0"/>
+          <a:chExt cx="0" cy="0"/>
+        </a:xfrm>
+      </p:grpSpPr>
+      <p:sp>
+        <p:nvSpPr>
+          <p:cNvPr id="10" name="Rectangle 9">
+            <a:extLst>
+              <a:ext uri="{FF2B5EF4-FFF2-40B4-BE49-F238E27FC236}">
+                <a16:creationId xmlns:a16="http://schemas.microsoft.com/office/drawing/2014/main" id="{A4AC5506-6312-4701-8D3C-40187889A947}"/>
+              </a:ext>
+              <a:ext uri="{C183D7F6-B498-43B3-948B-1728B52AA6E4}">
+                <adec:decorative xmlns:adec="http://schemas.microsoft.com/office/drawing/2017/decorative" val="1"/>
+              </a:ext>
+            </a:extLst>
+          </p:cNvPr>
+          <p:cNvSpPr>
+            <a:spLocks noGrp="1" noRot="1" noChangeAspect="1" noMove="1" noResize="1" noEditPoints="1" noAdjustHandles="1" noChangeArrowheads="1" noChangeShapeType="1" noTextEdit="1"/>
+          </p:cNvSpPr>
+          <p:nvPr>
+            <p:extLst>
+              <p:ext uri="{386F3935-93C4-4BCD-93E2-E3B085C9AB24}">
+                <p16:designElem xmlns:p16="http://schemas.microsoft.com/office/powerpoint/2015/main" val="1"/>
+              </p:ext>
+            </p:extLst>
+          </p:nvPr>
+        </p:nvSpPr>
+        <p:spPr>
+          <a:xfrm>
+            <a:off x="0" y="651752"/>
+            <a:ext cx="12192000" cy="736551"/>
+          </a:xfrm>
+          <a:prstGeom prst="rect">
+            <a:avLst/>
+          </a:prstGeom>
+          <a:solidFill>
+            <a:schemeClr val="tx1"/>
+          </a:solidFill>
+          <a:ln>
+            <a:noFill/>
+          </a:ln>
+        </p:spPr>
+        <p:style>
+          <a:lnRef idx="2">
+            <a:schemeClr val="accent1">
+              <a:shade val="50000"/>
+            </a:schemeClr>
+          </a:lnRef>
+          <a:fillRef idx="1">
+            <a:schemeClr val="accent1"/>
+          </a:fillRef>
+          <a:effectRef idx="0">
+            <a:schemeClr val="accent1"/>
+          </a:effectRef>
+          <a:fontRef idx="minor">
+            <a:schemeClr val="lt1"/>
+          </a:fontRef>
+        </p:style>
+        <p:txBody>
+          <a:bodyPr rtlCol="0" anchor="ctr"/>
+          <a:lstStyle/>
+          <a:p>
+            <a:pPr algn="ctr"/>
+            <a:endParaRPr lang="en-US"/>
+          </a:p>
+        </p:txBody>
+      </p:sp>
+      <p:sp>
+        <p:nvSpPr>
+          <p:cNvPr id="2" name="Заголовок 1">
+            <a:extLst>
+              <a:ext uri="{FF2B5EF4-FFF2-40B4-BE49-F238E27FC236}">
+                <a16:creationId xmlns:a16="http://schemas.microsoft.com/office/drawing/2014/main" id="{B49B37D4-6D74-4E29-9255-32DC7DAEB757}"/>
+              </a:ext>
+            </a:extLst>
+          </p:cNvPr>
+          <p:cNvSpPr>
+            <a:spLocks noGrp="1"/>
+          </p:cNvSpPr>
+          <p:nvPr>
+            <p:ph type="title"/>
+          </p:nvPr>
+        </p:nvSpPr>
+        <p:spPr>
+          <a:xfrm>
+            <a:off x="556532" y="643467"/>
+            <a:ext cx="11210925" cy="744836"/>
+          </a:xfrm>
+        </p:spPr>
+        <p:txBody>
+          <a:bodyPr vert="horz" lIns="91440" tIns="45720" rIns="91440" bIns="45720" rtlCol="0" anchor="ctr">
+            <a:normAutofit/>
+          </a:bodyPr>
+          <a:lstStyle/>
+          <a:p>
+            <a:pPr algn="ctr"/>
+            <a:r>
+              <a:rPr lang="en-US" sz="3200" kern="1200">
+                <a:solidFill>
+                  <a:schemeClr val="bg1"/>
+                </a:solidFill>
+                <a:latin typeface="+mj-lt"/>
+                <a:ea typeface="+mj-ea"/>
+                <a:cs typeface="+mj-cs"/>
+              </a:rPr>
+              <a:t>Страница очереди</a:t>
+            </a:r>
+          </a:p>
+        </p:txBody>
+      </p:sp>
+      <p:pic>
+        <p:nvPicPr>
+          <p:cNvPr id="5" name="Объект 4" descr="Изображение выглядит как снимок экрана&#10;&#10;Автоматически созданное описание">
+            <a:extLst>
+              <a:ext uri="{FF2B5EF4-FFF2-40B4-BE49-F238E27FC236}">
+                <a16:creationId xmlns:a16="http://schemas.microsoft.com/office/drawing/2014/main" id="{0EC8A776-D485-429A-B19E-29AB235E79EE}"/>
+              </a:ext>
+            </a:extLst>
+          </p:cNvPr>
+          <p:cNvPicPr>
+            <a:picLocks noGrp="1" noChangeAspect="1"/>
+          </p:cNvPicPr>
+          <p:nvPr>
+            <p:ph idx="1"/>
+          </p:nvPr>
+        </p:nvPicPr>
+        <p:blipFill>
+          <a:blip r:embed="rId2">
+            <a:extLst>
+              <a:ext uri="{28A0092B-C50C-407E-A947-70E740481C1C}">
+                <a14:useLocalDpi xmlns:a14="http://schemas.microsoft.com/office/drawing/2010/main" val="0"/>
+              </a:ext>
+            </a:extLst>
+          </a:blip>
+          <a:stretch>
+            <a:fillRect/>
+          </a:stretch>
+        </p:blipFill>
+        <p:spPr>
+          <a:xfrm>
+            <a:off x="1745309" y="1675227"/>
+            <a:ext cx="8701382" cy="4394199"/>
+          </a:xfrm>
+          <a:prstGeom prst="rect">
+            <a:avLst/>
+          </a:prstGeom>
+          <a:effectLst>
+            <a:glow rad="101600">
+              <a:schemeClr val="accent3">
+                <a:satMod val="175000"/>
+                <a:alpha val="40000"/>
+              </a:schemeClr>
+            </a:glow>
+            <a:outerShdw blurRad="50800" dist="38100" dir="2700000" algn="tl" rotWithShape="0">
+              <a:prstClr val="black">
+                <a:alpha val="40000"/>
+              </a:prstClr>
+            </a:outerShdw>
+          </a:effectLst>
+        </p:spPr>
+      </p:pic>
+    </p:spTree>
+    <p:extLst>
+      <p:ext uri="{BB962C8B-B14F-4D97-AF65-F5344CB8AC3E}">
+        <p14:creationId xmlns:p14="http://schemas.microsoft.com/office/powerpoint/2010/main" val="2479078614"/>
+      </p:ext>
+    </p:extLst>
+  </p:cSld>
+  <p:clrMapOvr>
+    <a:masterClrMapping/>
+  </p:clrMapOvr>
+</p:sld>
+</file>
+
+<file path=ppt/slides/slide7.xml><?xml version="1.0" encoding="utf-8"?>
 <p:sld xmlns:a="http://schemas.openxmlformats.org/drawingml/2006/main" xmlns:r="http://schemas.openxmlformats.org/officeDocument/2006/relationships" xmlns:p="http://schemas.openxmlformats.org/presentationml/2006/main">
   <p:cSld>
     <p:bg>
@@ -6699,7 +7625,7 @@
 </p:sld>
 </file>
 
-<file path=ppt/slides/slide7.xml><?xml version="1.0" encoding="utf-8"?>
+<file path=ppt/slides/slide8.xml><?xml version="1.0" encoding="utf-8"?>
 <p:sld xmlns:a="http://schemas.openxmlformats.org/drawingml/2006/main" xmlns:r="http://schemas.openxmlformats.org/officeDocument/2006/relationships" xmlns:p="http://schemas.openxmlformats.org/presentationml/2006/main">
   <p:cSld>
     <p:bg>
@@ -7426,9 +8352,17 @@
 </p:sld>
 </file>
 
-<file path=ppt/slides/slide8.xml><?xml version="1.0" encoding="utf-8"?>
+<file path=ppt/slides/slide9.xml><?xml version="1.0" encoding="utf-8"?>
 <p:sld xmlns:a="http://schemas.openxmlformats.org/drawingml/2006/main" xmlns:r="http://schemas.openxmlformats.org/officeDocument/2006/relationships" xmlns:p="http://schemas.openxmlformats.org/presentationml/2006/main">
   <p:cSld>
+    <p:bg>
+      <p:bgPr>
+        <a:solidFill>
+          <a:schemeClr val="bg1"/>
+        </a:solidFill>
+        <a:effectLst/>
+      </p:bgPr>
+    </p:bg>
     <p:spTree>
       <p:nvGrpSpPr>
         <p:cNvPr id="1" name=""/>
@@ -7445,10 +8379,10 @@
       </p:grpSpPr>
       <p:sp>
         <p:nvSpPr>
-          <p:cNvPr id="2" name="Заголовок 1">
-            <a:extLst>
-              <a:ext uri="{FF2B5EF4-FFF2-40B4-BE49-F238E27FC236}">
-                <a16:creationId xmlns:a16="http://schemas.microsoft.com/office/drawing/2014/main" id="{8C83DA32-7C42-4F9A-BF62-A53F304D868D}"/>
+          <p:cNvPr id="51" name="Заголовок 1">
+            <a:extLst>
+              <a:ext uri="{FF2B5EF4-FFF2-40B4-BE49-F238E27FC236}">
+                <a16:creationId xmlns:a16="http://schemas.microsoft.com/office/drawing/2014/main" id="{BDFAC066-CBCE-447D-95BF-F08E20D9560B}"/>
               </a:ext>
             </a:extLst>
           </p:cNvPr>
@@ -7457,104 +8391,195 @@
           </p:cNvSpPr>
           <p:nvPr>
             <p:ph type="title"/>
-          </p:nvPr>
-        </p:nvSpPr>
-        <p:spPr/>
-        <p:txBody>
-          <a:bodyPr/>
-          <a:lstStyle/>
-          <a:p>
-            <a:pPr algn="ctr"/>
-            <a:r>
-              <a:rPr lang="ru-RU" dirty="0"/>
-              <a:t>Ссылки</a:t>
-            </a:r>
-          </a:p>
-        </p:txBody>
-      </p:sp>
-      <p:sp>
-        <p:nvSpPr>
-          <p:cNvPr id="3" name="Объект 2">
-            <a:extLst>
-              <a:ext uri="{FF2B5EF4-FFF2-40B4-BE49-F238E27FC236}">
-                <a16:creationId xmlns:a16="http://schemas.microsoft.com/office/drawing/2014/main" id="{9396EB23-4167-4AE9-B114-0B3EC2CC586F}"/>
-              </a:ext>
-            </a:extLst>
-          </p:cNvPr>
-          <p:cNvSpPr>
-            <a:spLocks noGrp="1"/>
-          </p:cNvSpPr>
-          <p:nvPr>
-            <p:ph idx="1"/>
           </p:nvPr>
         </p:nvSpPr>
         <p:spPr>
           <a:xfrm>
-            <a:off x="838200" y="3047999"/>
-            <a:ext cx="10515600" cy="3128963"/>
+            <a:off x="481013" y="3752849"/>
+            <a:ext cx="3290887" cy="2452687"/>
           </a:xfrm>
         </p:spPr>
         <p:txBody>
-          <a:bodyPr/>
+          <a:bodyPr vert="horz" lIns="91440" tIns="45720" rIns="91440" bIns="45720" rtlCol="0" anchor="ctr">
+            <a:normAutofit/>
+          </a:bodyPr>
           <a:lstStyle/>
           <a:p>
             <a:r>
-              <a:rPr lang="en-US" dirty="0"/>
-              <a:t>REST API: </a:t>
-            </a:r>
-            <a:r>
-              <a:rPr lang="en-US" dirty="0">
-                <a:hlinkClick r:id="rId2"/>
-              </a:rPr>
-              <a:t>https://github.com/AppLoidx/helios-rest-api</a:t>
-            </a:r>
-            <a:endParaRPr lang="en-US" dirty="0"/>
-          </a:p>
-          <a:p>
-            <a:r>
-              <a:rPr lang="en-US" dirty="0"/>
-              <a:t>Backend: </a:t>
-            </a:r>
-            <a:r>
-              <a:rPr lang="en-US" dirty="0">
-                <a:hlinkClick r:id="rId3"/>
-              </a:rPr>
-              <a:t>https://github.com/AppLoidx/helios-backend</a:t>
-            </a:r>
-            <a:endParaRPr lang="en-US" dirty="0"/>
-          </a:p>
-          <a:p>
-            <a:r>
-              <a:rPr lang="en-US" dirty="0"/>
-              <a:t>Frontend: </a:t>
-            </a:r>
-            <a:r>
-              <a:rPr lang="en-US" dirty="0">
-                <a:hlinkClick r:id="rId4"/>
-              </a:rPr>
-              <a:t>https://github.com/AppLoidx/helios-front-end</a:t>
-            </a:r>
-            <a:endParaRPr lang="en-US" dirty="0"/>
-          </a:p>
-          <a:p>
-            <a:r>
-              <a:rPr lang="en-US" dirty="0"/>
-              <a:t>API Docs: </a:t>
-            </a:r>
-            <a:r>
-              <a:rPr lang="en-US" dirty="0">
-                <a:hlinkClick r:id="rId5"/>
-              </a:rPr>
-              <a:t>https://apploidx.github.io/helios-doc/</a:t>
-            </a:r>
-            <a:endParaRPr lang="ru-RU" dirty="0"/>
+              <a:rPr lang="en-US" sz="3600" dirty="0" err="1"/>
+              <a:t>Oauth</a:t>
+            </a:r>
+            <a:r>
+              <a:rPr lang="en-US" sz="3600" dirty="0"/>
+              <a:t> 2.0</a:t>
+            </a:r>
+          </a:p>
+        </p:txBody>
+      </p:sp>
+      <p:pic>
+        <p:nvPicPr>
+          <p:cNvPr id="11" name="Объект 10">
+            <a:extLst>
+              <a:ext uri="{FF2B5EF4-FFF2-40B4-BE49-F238E27FC236}">
+                <a16:creationId xmlns:a16="http://schemas.microsoft.com/office/drawing/2014/main" id="{D28FE689-3EFF-4552-952C-D066899F2845}"/>
+              </a:ext>
+            </a:extLst>
+          </p:cNvPr>
+          <p:cNvPicPr>
+            <a:picLocks noChangeAspect="1"/>
+          </p:cNvPicPr>
+          <p:nvPr/>
+        </p:nvPicPr>
+        <p:blipFill rotWithShape="1">
+          <a:blip r:embed="rId2">
+            <a:extLst>
+              <a:ext uri="{28A0092B-C50C-407E-A947-70E740481C1C}">
+                <a14:useLocalDpi xmlns:a14="http://schemas.microsoft.com/office/drawing/2010/main" val="0"/>
+              </a:ext>
+            </a:extLst>
+          </a:blip>
+          <a:srcRect t="4169" b="4298"/>
+          <a:stretch/>
+        </p:blipFill>
+        <p:spPr>
+          <a:xfrm>
+            <a:off x="20" y="10"/>
+            <a:ext cx="12191980" cy="3710603"/>
+          </a:xfrm>
+          <a:custGeom>
+            <a:avLst/>
+            <a:gdLst>
+              <a:gd name="connsiteX0" fmla="*/ 0 w 12192000"/>
+              <a:gd name="connsiteY0" fmla="*/ 0 h 3692092"/>
+              <a:gd name="connsiteX1" fmla="*/ 12192000 w 12192000"/>
+              <a:gd name="connsiteY1" fmla="*/ 0 h 3692092"/>
+              <a:gd name="connsiteX2" fmla="*/ 12192000 w 12192000"/>
+              <a:gd name="connsiteY2" fmla="*/ 3504824 h 3692092"/>
+              <a:gd name="connsiteX3" fmla="*/ 12024691 w 12192000"/>
+              <a:gd name="connsiteY3" fmla="*/ 3517794 h 3692092"/>
+              <a:gd name="connsiteX4" fmla="*/ 160485 w 12192000"/>
+              <a:gd name="connsiteY4" fmla="*/ 3663863 h 3692092"/>
+              <a:gd name="connsiteX5" fmla="*/ 0 w 12192000"/>
+              <a:gd name="connsiteY5" fmla="*/ 3692092 h 3692092"/>
+            </a:gdLst>
+            <a:ahLst/>
+            <a:cxnLst>
+              <a:cxn ang="0">
+                <a:pos x="connsiteX0" y="connsiteY0"/>
+              </a:cxn>
+              <a:cxn ang="0">
+                <a:pos x="connsiteX1" y="connsiteY1"/>
+              </a:cxn>
+              <a:cxn ang="0">
+                <a:pos x="connsiteX2" y="connsiteY2"/>
+              </a:cxn>
+              <a:cxn ang="0">
+                <a:pos x="connsiteX3" y="connsiteY3"/>
+              </a:cxn>
+              <a:cxn ang="0">
+                <a:pos x="connsiteX4" y="connsiteY4"/>
+              </a:cxn>
+              <a:cxn ang="0">
+                <a:pos x="connsiteX5" y="connsiteY5"/>
+              </a:cxn>
+            </a:cxnLst>
+            <a:rect l="l" t="t" r="r" b="b"/>
+            <a:pathLst>
+              <a:path w="12192000" h="3692092">
+                <a:moveTo>
+                  <a:pt x="0" y="0"/>
+                </a:moveTo>
+                <a:lnTo>
+                  <a:pt x="12192000" y="0"/>
+                </a:lnTo>
+                <a:lnTo>
+                  <a:pt x="12192000" y="3504824"/>
+                </a:lnTo>
+                <a:lnTo>
+                  <a:pt x="12024691" y="3517794"/>
+                </a:lnTo>
+                <a:cubicBezTo>
+                  <a:pt x="8077523" y="3783195"/>
+                  <a:pt x="4094678" y="3026959"/>
+                  <a:pt x="160485" y="3663863"/>
+                </a:cubicBezTo>
+                <a:lnTo>
+                  <a:pt x="0" y="3692092"/>
+                </a:lnTo>
+                <a:close/>
+              </a:path>
+            </a:pathLst>
+          </a:custGeom>
+        </p:spPr>
+      </p:pic>
+      <p:sp>
+        <p:nvSpPr>
+          <p:cNvPr id="30" name="Content Placeholder 29">
+            <a:extLst>
+              <a:ext uri="{FF2B5EF4-FFF2-40B4-BE49-F238E27FC236}">
+                <a16:creationId xmlns:a16="http://schemas.microsoft.com/office/drawing/2014/main" id="{2FFE4E11-E4C4-4ED4-B780-FA0161D6A746}"/>
+              </a:ext>
+            </a:extLst>
+          </p:cNvPr>
+          <p:cNvSpPr>
+            <a:spLocks noGrp="1"/>
+          </p:cNvSpPr>
+          <p:nvPr>
+            <p:ph idx="1"/>
+          </p:nvPr>
+        </p:nvSpPr>
+        <p:spPr>
+          <a:xfrm>
+            <a:off x="4223982" y="3752850"/>
+            <a:ext cx="7485413" cy="2452687"/>
+          </a:xfrm>
+        </p:spPr>
+        <p:txBody>
+          <a:bodyPr anchor="ctr">
+            <a:normAutofit/>
+          </a:bodyPr>
+          <a:lstStyle/>
+          <a:p>
+            <a:r>
+              <a:rPr lang="ru-RU" sz="1800" dirty="0"/>
+              <a:t>Имплементация известного протокола</a:t>
+            </a:r>
+          </a:p>
+          <a:p>
+            <a:r>
+              <a:rPr lang="ru-RU" sz="1800" dirty="0"/>
+              <a:t>Возможность использования </a:t>
+            </a:r>
+            <a:r>
+              <a:rPr lang="en-US" sz="1800" dirty="0"/>
+              <a:t>API </a:t>
+            </a:r>
+            <a:r>
+              <a:rPr lang="ru-RU" sz="1800" dirty="0"/>
+              <a:t>в сторонних приложениях и сервисах</a:t>
+            </a:r>
+          </a:p>
+          <a:p>
+            <a:r>
+              <a:rPr lang="ru-RU" sz="1800" dirty="0"/>
+              <a:t>Общий </a:t>
+            </a:r>
+            <a:r>
+              <a:rPr lang="en-US" sz="1800" dirty="0"/>
+              <a:t>API </a:t>
+            </a:r>
+            <a:r>
+              <a:rPr lang="ru-RU" sz="1800" dirty="0"/>
+              <a:t>для управления всеми очередями</a:t>
+            </a:r>
+            <a:endParaRPr lang="en-US" sz="1800" dirty="0"/>
           </a:p>
         </p:txBody>
       </p:sp>
     </p:spTree>
     <p:extLst>
       <p:ext uri="{BB962C8B-B14F-4D97-AF65-F5344CB8AC3E}">
-        <p14:creationId xmlns:p14="http://schemas.microsoft.com/office/powerpoint/2010/main" val="949164365"/>
+        <p14:creationId xmlns:p14="http://schemas.microsoft.com/office/powerpoint/2010/main" val="3108850667"/>
       </p:ext>
     </p:extLst>
   </p:cSld>

</xml_diff>